<commit_message>
create method for get TransitionInfo
</commit_message>
<xml_diff>
--- a/DisorderEvent/data/question.pptx
+++ b/DisorderEvent/data/question.pptx
@@ -2370,8 +2370,9 @@
         <p:txBody>
           <a:bodyPr lIns="0" rIns="0" tIns="0" bIns="0" anchor="ctr"/>
           <a:p>
+            <a:pPr algn="ctr"/>
             <a:r>
-              <a:rPr lang="en-US">
+              <a:rPr lang="en-US" sz="4400">
                 <a:latin typeface="Arial"/>
               </a:rPr>
               <a:t>单击鼠标编辑标题文字格式</a:t>
@@ -2560,8 +2561,9 @@
         <p:txBody>
           <a:bodyPr lIns="0" rIns="0" tIns="0" bIns="0" anchor="ctr"/>
           <a:p>
+            <a:pPr algn="ctr"/>
             <a:r>
-              <a:rPr lang="en-US">
+              <a:rPr lang="en-US" sz="4400">
                 <a:latin typeface="Arial"/>
               </a:rPr>
               <a:t>单击鼠标编辑标题文字格式</a:t>
@@ -2598,7 +2600,7 @@
               <a:buChar char=""/>
             </a:pPr>
             <a:r>
-              <a:rPr lang="en-US">
+              <a:rPr lang="en-US" sz="3200">
                 <a:latin typeface="Arial"/>
               </a:rPr>
               <a:t>单击鼠标编辑大纲文字格式</a:t>
@@ -2612,7 +2614,7 @@
               <a:buChar char=""/>
             </a:pPr>
             <a:r>
-              <a:rPr lang="en-US">
+              <a:rPr lang="en-US" sz="2800">
                 <a:latin typeface="Arial"/>
               </a:rPr>
               <a:t>第二个大纲级</a:t>
@@ -2626,7 +2628,7 @@
               <a:buChar char=""/>
             </a:pPr>
             <a:r>
-              <a:rPr lang="en-US">
+              <a:rPr lang="en-US" sz="2400">
                 <a:latin typeface="Arial"/>
               </a:rPr>
               <a:t>第三大纲级别</a:t>
@@ -2640,7 +2642,7 @@
               <a:buChar char=""/>
             </a:pPr>
             <a:r>
-              <a:rPr lang="en-US">
+              <a:rPr lang="en-US" sz="2000">
                 <a:latin typeface="Arial"/>
               </a:rPr>
               <a:t>第四大纲级别</a:t>
@@ -2654,7 +2656,7 @@
               <a:buChar char=""/>
             </a:pPr>
             <a:r>
-              <a:rPr lang="en-US">
+              <a:rPr lang="en-US" sz="2000">
                 <a:latin typeface="Arial"/>
               </a:rPr>
               <a:t>第五大纲级别</a:t>
@@ -2668,7 +2670,7 @@
               <a:buChar char=""/>
             </a:pPr>
             <a:r>
-              <a:rPr lang="en-US">
+              <a:rPr lang="en-US" sz="2000">
                 <a:latin typeface="Arial"/>
               </a:rPr>
               <a:t>第六大纲级别</a:t>
@@ -2682,7 +2684,7 @@
               <a:buChar char=""/>
             </a:pPr>
             <a:r>
-              <a:rPr lang="en-US">
+              <a:rPr lang="en-US" sz="2000">
                 <a:latin typeface="Arial"/>
               </a:rPr>
               <a:t>第七大纲级别</a:t>
@@ -3183,7 +3185,7 @@
         </p:nvGraphicFramePr>
         <p:xfrm>
           <a:off x="531720" y="3997440"/>
-          <a:ext cx="9070560" cy="801720"/>
+          <a:ext cx="9070200" cy="801720"/>
         </p:xfrm>
         <a:graphic>
           <a:graphicData uri="http://schemas.openxmlformats.org/drawingml/2006/table">
@@ -3471,12 +3473,94 @@
           <a:bodyPr lIns="0" rIns="0" tIns="0" bIns="0" anchor="ctr"/>
           <a:p>
             <a:pPr algn="ctr"/>
+            <a:r>
+              <a:rPr lang="en-US" sz="4400">
+                <a:latin typeface="Arial"/>
+              </a:rPr>
+              <a:t>新算法的辅助信息</a:t>
+            </a:r>
+            <a:endParaRPr/>
+          </a:p>
+        </p:txBody>
+      </p:sp>
+      <p:sp>
+        <p:nvSpPr>
+          <p:cNvPr id="80" name="TextShape 2"/>
+          <p:cNvSpPr txBox="1"/>
+          <p:nvPr/>
+        </p:nvSpPr>
+        <p:spPr>
+          <a:xfrm>
+            <a:off x="1152000" y="2592000"/>
+            <a:ext cx="6264000" cy="690840"/>
+          </a:xfrm>
+          <a:prstGeom prst="rect">
+            <a:avLst/>
+          </a:prstGeom>
+        </p:spPr>
+        <p:txBody>
+          <a:bodyPr lIns="90000" rIns="90000" tIns="45000" bIns="45000"/>
+          <a:p>
+            <a:r>
+              <a:rPr lang="en-US">
+                <a:latin typeface="Arial"/>
+              </a:rPr>
+              <a:t>1.</a:t>
+            </a:r>
+            <a:r>
+              <a:rPr lang="en-US">
+                <a:latin typeface="Arial"/>
+              </a:rPr>
+              <a:t>每个</a:t>
+            </a:r>
+            <a:r>
+              <a:rPr lang="en-US">
+                <a:latin typeface="Arial"/>
+              </a:rPr>
+              <a:t>transition</a:t>
+            </a:r>
+            <a:r>
+              <a:rPr lang="en-US">
+                <a:latin typeface="Arial"/>
+              </a:rPr>
+              <a:t>是否是</a:t>
+            </a:r>
+            <a:endParaRPr/>
+          </a:p>
+          <a:p>
             <a:endParaRPr/>
           </a:p>
         </p:txBody>
       </p:sp>
     </p:spTree>
   </p:cSld>
+  <p:timing>
+    <p:tnLst>
+      <p:par>
+        <p:cTn id="5" dur="indefinite" restart="never" nodeType="tmRoot">
+          <p:childTnLst>
+            <p:seq>
+              <p:cTn id="6" nodeType="mainSeq"/>
+              <p:prevCondLst>
+                <p:cond delay="0" evt="onPrev">
+                  <p:tgtEl>
+                    <p:sldTgt/>
+                  </p:tgtEl>
+                </p:cond>
+              </p:prevCondLst>
+              <p:nextCondLst>
+                <p:cond delay="0" evt="onNext">
+                  <p:tgtEl>
+                    <p:sldTgt/>
+                  </p:tgtEl>
+                </p:cond>
+              </p:nextCondLst>
+            </p:seq>
+          </p:childTnLst>
+        </p:cTn>
+      </p:par>
+    </p:tnLst>
+  </p:timing>
 </p:sld>
 </file>
 

</xml_diff>

<commit_message>
add the new cost function
</commit_message>
<xml_diff>
--- a/DisorderEvent/data/question.pptx
+++ b/DisorderEvent/data/question.pptx
@@ -3,12 +3,11 @@
 <p:presentation xmlns:a="http://schemas.openxmlformats.org/drawingml/2006/main" xmlns:p="http://schemas.openxmlformats.org/presentationml/2006/main" xmlns:r="http://schemas.openxmlformats.org/officeDocument/2006/relationships">
   <p:sldMasterIdLst>
     <p:sldMasterId id="2147483648" r:id="rId2"/>
-    <p:sldMasterId id="2147483661" r:id="rId3"/>
   </p:sldMasterIdLst>
   <p:sldIdLst>
-    <p:sldId id="256" r:id="rId4"/>
-    <p:sldId id="257" r:id="rId5"/>
-    <p:sldId id="258" r:id="rId6"/>
+    <p:sldId id="256" r:id="rId3"/>
+    <p:sldId id="257" r:id="rId4"/>
+    <p:sldId id="258" r:id="rId5"/>
   </p:sldIdLst>
   <p:sldSz cx="10080625" cy="7559675"/>
   <p:notesSz cx="7559675" cy="10691812"/>
@@ -67,7 +66,7 @@
         <p:spPr>
           <a:xfrm>
             <a:off x="504000" y="301320"/>
-            <a:ext cx="9071280" cy="1262520"/>
+            <a:ext cx="9072000" cy="1262160"/>
           </a:xfrm>
           <a:prstGeom prst="rect">
             <a:avLst/>
@@ -93,8 +92,8 @@
         </p:nvSpPr>
         <p:spPr>
           <a:xfrm>
-            <a:off x="504000" y="1769040"/>
-            <a:ext cx="9071280" cy="2090880"/>
+            <a:off x="504000" y="1768680"/>
+            <a:ext cx="9072000" cy="2090880"/>
           </a:xfrm>
           <a:prstGeom prst="rect">
             <a:avLst/>
@@ -119,8 +118,8 @@
         </p:nvSpPr>
         <p:spPr>
           <a:xfrm>
-            <a:off x="504000" y="4059000"/>
-            <a:ext cx="9071280" cy="2090880"/>
+            <a:off x="504000" y="4058640"/>
+            <a:ext cx="9072000" cy="2090880"/>
           </a:xfrm>
           <a:prstGeom prst="rect">
             <a:avLst/>
@@ -168,7 +167,7 @@
         <p:spPr>
           <a:xfrm>
             <a:off x="504000" y="301320"/>
-            <a:ext cx="9071280" cy="1262520"/>
+            <a:ext cx="9072000" cy="1262160"/>
           </a:xfrm>
           <a:prstGeom prst="rect">
             <a:avLst/>
@@ -194,8 +193,8 @@
         </p:nvSpPr>
         <p:spPr>
           <a:xfrm>
-            <a:off x="504000" y="1769040"/>
-            <a:ext cx="4426560" cy="2090880"/>
+            <a:off x="504000" y="1768680"/>
+            <a:ext cx="4426920" cy="2090880"/>
           </a:xfrm>
           <a:prstGeom prst="rect">
             <a:avLst/>
@@ -220,8 +219,8 @@
         </p:nvSpPr>
         <p:spPr>
           <a:xfrm>
-            <a:off x="5152320" y="1769040"/>
-            <a:ext cx="4426560" cy="2090880"/>
+            <a:off x="5152680" y="1768680"/>
+            <a:ext cx="4426920" cy="2090880"/>
           </a:xfrm>
           <a:prstGeom prst="rect">
             <a:avLst/>
@@ -246,8 +245,8 @@
         </p:nvSpPr>
         <p:spPr>
           <a:xfrm>
-            <a:off x="5152320" y="4059000"/>
-            <a:ext cx="4426560" cy="2090880"/>
+            <a:off x="5152680" y="4058640"/>
+            <a:ext cx="4426920" cy="2090880"/>
           </a:xfrm>
           <a:prstGeom prst="rect">
             <a:avLst/>
@@ -272,8 +271,8 @@
         </p:nvSpPr>
         <p:spPr>
           <a:xfrm>
-            <a:off x="504000" y="4059000"/>
-            <a:ext cx="4426560" cy="2090880"/>
+            <a:off x="504000" y="4058640"/>
+            <a:ext cx="4426920" cy="2090880"/>
           </a:xfrm>
           <a:prstGeom prst="rect">
             <a:avLst/>
@@ -321,7 +320,7 @@
         <p:spPr>
           <a:xfrm>
             <a:off x="504000" y="301320"/>
-            <a:ext cx="9071280" cy="1262520"/>
+            <a:ext cx="9072000" cy="1262160"/>
           </a:xfrm>
           <a:prstGeom prst="rect">
             <a:avLst/>
@@ -347,8 +346,8 @@
         </p:nvSpPr>
         <p:spPr>
           <a:xfrm>
-            <a:off x="504000" y="1769040"/>
-            <a:ext cx="9071280" cy="4384080"/>
+            <a:off x="504000" y="1768680"/>
+            <a:ext cx="9072000" cy="4384080"/>
           </a:xfrm>
           <a:prstGeom prst="rect">
             <a:avLst/>
@@ -373,8 +372,8 @@
         </p:nvSpPr>
         <p:spPr>
           <a:xfrm>
-            <a:off x="504000" y="1769040"/>
-            <a:ext cx="9071280" cy="4384080"/>
+            <a:off x="504000" y="1768680"/>
+            <a:ext cx="9072000" cy="4384080"/>
           </a:xfrm>
           <a:prstGeom prst="rect">
             <a:avLst/>
@@ -401,7 +400,7 @@
         </p:blipFill>
         <p:spPr>
           <a:xfrm>
-            <a:off x="2292120" y="1769040"/>
+            <a:off x="2292480" y="1768680"/>
             <a:ext cx="5494680" cy="4384080"/>
           </a:xfrm>
           <a:prstGeom prst="rect">
@@ -426,7 +425,7 @@
         </p:blipFill>
         <p:spPr>
           <a:xfrm>
-            <a:off x="2292120" y="1769040"/>
+            <a:off x="2292480" y="1768680"/>
             <a:ext cx="5494680" cy="4384080"/>
           </a:xfrm>
           <a:prstGeom prst="rect">
@@ -437,505 +436,6 @@
           </a:ln>
         </p:spPr>
       </p:pic>
-    </p:spTree>
-  </p:cSld>
-</p:sldLayout>
-</file>
-
-<file path=ppt/slideLayouts/slideLayout13.xml><?xml version="1.0" encoding="utf-8"?>
-<p:sldLayout xmlns:a="http://schemas.openxmlformats.org/drawingml/2006/main" xmlns:p="http://schemas.openxmlformats.org/presentationml/2006/main" xmlns:r="http://schemas.openxmlformats.org/officeDocument/2006/relationships" type="blank" preserve="1">
-  <p:cSld name="Blank Slide">
-    <p:spTree>
-      <p:nvGrpSpPr>
-        <p:cNvPr id="1" name=""/>
-        <p:cNvGrpSpPr/>
-        <p:nvPr/>
-      </p:nvGrpSpPr>
-      <p:grpSpPr>
-        <a:xfrm>
-          <a:off x="0" y="0"/>
-          <a:ext cx="0" cy="0"/>
-          <a:chOff x="0" y="0"/>
-          <a:chExt cx="0" cy="0"/>
-        </a:xfrm>
-      </p:grpSpPr>
-    </p:spTree>
-  </p:cSld>
-</p:sldLayout>
-</file>
-
-<file path=ppt/slideLayouts/slideLayout14.xml><?xml version="1.0" encoding="utf-8"?>
-<p:sldLayout xmlns:a="http://schemas.openxmlformats.org/drawingml/2006/main" xmlns:p="http://schemas.openxmlformats.org/presentationml/2006/main" xmlns:r="http://schemas.openxmlformats.org/officeDocument/2006/relationships" type="tx" preserve="1">
-  <p:cSld name="Title Slide">
-    <p:spTree>
-      <p:nvGrpSpPr>
-        <p:cNvPr id="1" name=""/>
-        <p:cNvGrpSpPr/>
-        <p:nvPr/>
-      </p:nvGrpSpPr>
-      <p:grpSpPr>
-        <a:xfrm>
-          <a:off x="0" y="0"/>
-          <a:ext cx="0" cy="0"/>
-          <a:chOff x="0" y="0"/>
-          <a:chExt cx="0" cy="0"/>
-        </a:xfrm>
-      </p:grpSpPr>
-      <p:sp>
-        <p:nvSpPr>
-          <p:cNvPr id="38" name="PlaceHolder 1"/>
-          <p:cNvSpPr>
-            <a:spLocks noGrp="1"/>
-          </p:cNvSpPr>
-          <p:nvPr>
-            <p:ph type="title"/>
-          </p:nvPr>
-        </p:nvSpPr>
-        <p:spPr>
-          <a:xfrm>
-            <a:off x="504000" y="301320"/>
-            <a:ext cx="9071280" cy="1262520"/>
-          </a:xfrm>
-          <a:prstGeom prst="rect">
-            <a:avLst/>
-          </a:prstGeom>
-        </p:spPr>
-        <p:txBody>
-          <a:bodyPr lIns="0" rIns="0" tIns="0" bIns="0" anchor="ctr"/>
-          <a:p>
-            <a:pPr algn="ctr"/>
-            <a:endParaRPr/>
-          </a:p>
-        </p:txBody>
-      </p:sp>
-      <p:sp>
-        <p:nvSpPr>
-          <p:cNvPr id="39" name="PlaceHolder 2"/>
-          <p:cNvSpPr>
-            <a:spLocks noGrp="1"/>
-          </p:cNvSpPr>
-          <p:nvPr>
-            <p:ph type="subTitle"/>
-          </p:nvPr>
-        </p:nvSpPr>
-        <p:spPr>
-          <a:xfrm>
-            <a:off x="504000" y="1769040"/>
-            <a:ext cx="9071280" cy="4384440"/>
-          </a:xfrm>
-          <a:prstGeom prst="rect">
-            <a:avLst/>
-          </a:prstGeom>
-        </p:spPr>
-        <p:txBody>
-          <a:bodyPr lIns="0" rIns="0" tIns="0" bIns="0" anchor="ctr"/>
-          <a:p>
-            <a:pPr algn="ctr"/>
-            <a:endParaRPr/>
-          </a:p>
-        </p:txBody>
-      </p:sp>
-    </p:spTree>
-  </p:cSld>
-</p:sldLayout>
-</file>
-
-<file path=ppt/slideLayouts/slideLayout15.xml><?xml version="1.0" encoding="utf-8"?>
-<p:sldLayout xmlns:a="http://schemas.openxmlformats.org/drawingml/2006/main" xmlns:p="http://schemas.openxmlformats.org/presentationml/2006/main" xmlns:r="http://schemas.openxmlformats.org/officeDocument/2006/relationships" type="obj" preserve="1">
-  <p:cSld name="Title, Content">
-    <p:spTree>
-      <p:nvGrpSpPr>
-        <p:cNvPr id="1" name=""/>
-        <p:cNvGrpSpPr/>
-        <p:nvPr/>
-      </p:nvGrpSpPr>
-      <p:grpSpPr>
-        <a:xfrm>
-          <a:off x="0" y="0"/>
-          <a:ext cx="0" cy="0"/>
-          <a:chOff x="0" y="0"/>
-          <a:chExt cx="0" cy="0"/>
-        </a:xfrm>
-      </p:grpSpPr>
-      <p:sp>
-        <p:nvSpPr>
-          <p:cNvPr id="40" name="PlaceHolder 1"/>
-          <p:cNvSpPr>
-            <a:spLocks noGrp="1"/>
-          </p:cNvSpPr>
-          <p:nvPr>
-            <p:ph type="title"/>
-          </p:nvPr>
-        </p:nvSpPr>
-        <p:spPr>
-          <a:xfrm>
-            <a:off x="504000" y="301320"/>
-            <a:ext cx="9071280" cy="1262520"/>
-          </a:xfrm>
-          <a:prstGeom prst="rect">
-            <a:avLst/>
-          </a:prstGeom>
-        </p:spPr>
-        <p:txBody>
-          <a:bodyPr lIns="0" rIns="0" tIns="0" bIns="0" anchor="ctr"/>
-          <a:p>
-            <a:pPr algn="ctr"/>
-            <a:endParaRPr/>
-          </a:p>
-        </p:txBody>
-      </p:sp>
-      <p:sp>
-        <p:nvSpPr>
-          <p:cNvPr id="41" name="PlaceHolder 2"/>
-          <p:cNvSpPr>
-            <a:spLocks noGrp="1"/>
-          </p:cNvSpPr>
-          <p:nvPr>
-            <p:ph type="body"/>
-          </p:nvPr>
-        </p:nvSpPr>
-        <p:spPr>
-          <a:xfrm>
-            <a:off x="504000" y="1769040"/>
-            <a:ext cx="9071280" cy="4384080"/>
-          </a:xfrm>
-          <a:prstGeom prst="rect">
-            <a:avLst/>
-          </a:prstGeom>
-        </p:spPr>
-        <p:txBody>
-          <a:bodyPr lIns="0" rIns="0" tIns="0" bIns="0"/>
-          <a:p>
-            <a:endParaRPr/>
-          </a:p>
-        </p:txBody>
-      </p:sp>
-    </p:spTree>
-  </p:cSld>
-</p:sldLayout>
-</file>
-
-<file path=ppt/slideLayouts/slideLayout16.xml><?xml version="1.0" encoding="utf-8"?>
-<p:sldLayout xmlns:a="http://schemas.openxmlformats.org/drawingml/2006/main" xmlns:p="http://schemas.openxmlformats.org/presentationml/2006/main" xmlns:r="http://schemas.openxmlformats.org/officeDocument/2006/relationships" type="twoObj" preserve="1">
-  <p:cSld name="Title, 2 Content">
-    <p:spTree>
-      <p:nvGrpSpPr>
-        <p:cNvPr id="1" name=""/>
-        <p:cNvGrpSpPr/>
-        <p:nvPr/>
-      </p:nvGrpSpPr>
-      <p:grpSpPr>
-        <a:xfrm>
-          <a:off x="0" y="0"/>
-          <a:ext cx="0" cy="0"/>
-          <a:chOff x="0" y="0"/>
-          <a:chExt cx="0" cy="0"/>
-        </a:xfrm>
-      </p:grpSpPr>
-      <p:sp>
-        <p:nvSpPr>
-          <p:cNvPr id="42" name="PlaceHolder 1"/>
-          <p:cNvSpPr>
-            <a:spLocks noGrp="1"/>
-          </p:cNvSpPr>
-          <p:nvPr>
-            <p:ph type="title"/>
-          </p:nvPr>
-        </p:nvSpPr>
-        <p:spPr>
-          <a:xfrm>
-            <a:off x="504000" y="301320"/>
-            <a:ext cx="9071280" cy="1262520"/>
-          </a:xfrm>
-          <a:prstGeom prst="rect">
-            <a:avLst/>
-          </a:prstGeom>
-        </p:spPr>
-        <p:txBody>
-          <a:bodyPr lIns="0" rIns="0" tIns="0" bIns="0" anchor="ctr"/>
-          <a:p>
-            <a:pPr algn="ctr"/>
-            <a:endParaRPr/>
-          </a:p>
-        </p:txBody>
-      </p:sp>
-      <p:sp>
-        <p:nvSpPr>
-          <p:cNvPr id="43" name="PlaceHolder 2"/>
-          <p:cNvSpPr>
-            <a:spLocks noGrp="1"/>
-          </p:cNvSpPr>
-          <p:nvPr>
-            <p:ph type="body"/>
-          </p:nvPr>
-        </p:nvSpPr>
-        <p:spPr>
-          <a:xfrm>
-            <a:off x="504000" y="1769040"/>
-            <a:ext cx="4426560" cy="4384080"/>
-          </a:xfrm>
-          <a:prstGeom prst="rect">
-            <a:avLst/>
-          </a:prstGeom>
-        </p:spPr>
-        <p:txBody>
-          <a:bodyPr lIns="0" rIns="0" tIns="0" bIns="0"/>
-          <a:p>
-            <a:endParaRPr/>
-          </a:p>
-        </p:txBody>
-      </p:sp>
-      <p:sp>
-        <p:nvSpPr>
-          <p:cNvPr id="44" name="PlaceHolder 3"/>
-          <p:cNvSpPr>
-            <a:spLocks noGrp="1"/>
-          </p:cNvSpPr>
-          <p:nvPr>
-            <p:ph type="body"/>
-          </p:nvPr>
-        </p:nvSpPr>
-        <p:spPr>
-          <a:xfrm>
-            <a:off x="5152320" y="1769040"/>
-            <a:ext cx="4426560" cy="4384080"/>
-          </a:xfrm>
-          <a:prstGeom prst="rect">
-            <a:avLst/>
-          </a:prstGeom>
-        </p:spPr>
-        <p:txBody>
-          <a:bodyPr lIns="0" rIns="0" tIns="0" bIns="0"/>
-          <a:p>
-            <a:endParaRPr/>
-          </a:p>
-        </p:txBody>
-      </p:sp>
-    </p:spTree>
-  </p:cSld>
-</p:sldLayout>
-</file>
-
-<file path=ppt/slideLayouts/slideLayout17.xml><?xml version="1.0" encoding="utf-8"?>
-<p:sldLayout xmlns:a="http://schemas.openxmlformats.org/drawingml/2006/main" xmlns:p="http://schemas.openxmlformats.org/presentationml/2006/main" xmlns:r="http://schemas.openxmlformats.org/officeDocument/2006/relationships" type="titleOnly" preserve="1">
-  <p:cSld name="Title Only">
-    <p:spTree>
-      <p:nvGrpSpPr>
-        <p:cNvPr id="1" name=""/>
-        <p:cNvGrpSpPr/>
-        <p:nvPr/>
-      </p:nvGrpSpPr>
-      <p:grpSpPr>
-        <a:xfrm>
-          <a:off x="0" y="0"/>
-          <a:ext cx="0" cy="0"/>
-          <a:chOff x="0" y="0"/>
-          <a:chExt cx="0" cy="0"/>
-        </a:xfrm>
-      </p:grpSpPr>
-      <p:sp>
-        <p:nvSpPr>
-          <p:cNvPr id="45" name="PlaceHolder 1"/>
-          <p:cNvSpPr>
-            <a:spLocks noGrp="1"/>
-          </p:cNvSpPr>
-          <p:nvPr>
-            <p:ph type="title"/>
-          </p:nvPr>
-        </p:nvSpPr>
-        <p:spPr>
-          <a:xfrm>
-            <a:off x="504000" y="301320"/>
-            <a:ext cx="9071280" cy="1262520"/>
-          </a:xfrm>
-          <a:prstGeom prst="rect">
-            <a:avLst/>
-          </a:prstGeom>
-        </p:spPr>
-        <p:txBody>
-          <a:bodyPr lIns="0" rIns="0" tIns="0" bIns="0" anchor="ctr"/>
-          <a:p>
-            <a:pPr algn="ctr"/>
-            <a:endParaRPr/>
-          </a:p>
-        </p:txBody>
-      </p:sp>
-    </p:spTree>
-  </p:cSld>
-</p:sldLayout>
-</file>
-
-<file path=ppt/slideLayouts/slideLayout18.xml><?xml version="1.0" encoding="utf-8"?>
-<p:sldLayout xmlns:a="http://schemas.openxmlformats.org/drawingml/2006/main" xmlns:p="http://schemas.openxmlformats.org/presentationml/2006/main" xmlns:r="http://schemas.openxmlformats.org/officeDocument/2006/relationships" type="objOnly" preserve="1">
-  <p:cSld name="Centered Text">
-    <p:spTree>
-      <p:nvGrpSpPr>
-        <p:cNvPr id="1" name=""/>
-        <p:cNvGrpSpPr/>
-        <p:nvPr/>
-      </p:nvGrpSpPr>
-      <p:grpSpPr>
-        <a:xfrm>
-          <a:off x="0" y="0"/>
-          <a:ext cx="0" cy="0"/>
-          <a:chOff x="0" y="0"/>
-          <a:chExt cx="0" cy="0"/>
-        </a:xfrm>
-      </p:grpSpPr>
-      <p:sp>
-        <p:nvSpPr>
-          <p:cNvPr id="46" name="PlaceHolder 1"/>
-          <p:cNvSpPr>
-            <a:spLocks noGrp="1"/>
-          </p:cNvSpPr>
-          <p:nvPr>
-            <p:ph type="subTitle"/>
-          </p:nvPr>
-        </p:nvSpPr>
-        <p:spPr>
-          <a:xfrm>
-            <a:off x="504000" y="301320"/>
-            <a:ext cx="9071280" cy="5852160"/>
-          </a:xfrm>
-          <a:prstGeom prst="rect">
-            <a:avLst/>
-          </a:prstGeom>
-        </p:spPr>
-        <p:txBody>
-          <a:bodyPr lIns="0" rIns="0" tIns="0" bIns="0" anchor="ctr"/>
-          <a:p>
-            <a:pPr algn="ctr"/>
-            <a:endParaRPr/>
-          </a:p>
-        </p:txBody>
-      </p:sp>
-    </p:spTree>
-  </p:cSld>
-</p:sldLayout>
-</file>
-
-<file path=ppt/slideLayouts/slideLayout19.xml><?xml version="1.0" encoding="utf-8"?>
-<p:sldLayout xmlns:a="http://schemas.openxmlformats.org/drawingml/2006/main" xmlns:p="http://schemas.openxmlformats.org/presentationml/2006/main" xmlns:r="http://schemas.openxmlformats.org/officeDocument/2006/relationships" type="twoObjAndObj" preserve="1">
-  <p:cSld name="Title, 2 Content and Content">
-    <p:spTree>
-      <p:nvGrpSpPr>
-        <p:cNvPr id="1" name=""/>
-        <p:cNvGrpSpPr/>
-        <p:nvPr/>
-      </p:nvGrpSpPr>
-      <p:grpSpPr>
-        <a:xfrm>
-          <a:off x="0" y="0"/>
-          <a:ext cx="0" cy="0"/>
-          <a:chOff x="0" y="0"/>
-          <a:chExt cx="0" cy="0"/>
-        </a:xfrm>
-      </p:grpSpPr>
-      <p:sp>
-        <p:nvSpPr>
-          <p:cNvPr id="47" name="PlaceHolder 1"/>
-          <p:cNvSpPr>
-            <a:spLocks noGrp="1"/>
-          </p:cNvSpPr>
-          <p:nvPr>
-            <p:ph type="title"/>
-          </p:nvPr>
-        </p:nvSpPr>
-        <p:spPr>
-          <a:xfrm>
-            <a:off x="504000" y="301320"/>
-            <a:ext cx="9071280" cy="1262520"/>
-          </a:xfrm>
-          <a:prstGeom prst="rect">
-            <a:avLst/>
-          </a:prstGeom>
-        </p:spPr>
-        <p:txBody>
-          <a:bodyPr lIns="0" rIns="0" tIns="0" bIns="0" anchor="ctr"/>
-          <a:p>
-            <a:pPr algn="ctr"/>
-            <a:endParaRPr/>
-          </a:p>
-        </p:txBody>
-      </p:sp>
-      <p:sp>
-        <p:nvSpPr>
-          <p:cNvPr id="48" name="PlaceHolder 2"/>
-          <p:cNvSpPr>
-            <a:spLocks noGrp="1"/>
-          </p:cNvSpPr>
-          <p:nvPr>
-            <p:ph type="body"/>
-          </p:nvPr>
-        </p:nvSpPr>
-        <p:spPr>
-          <a:xfrm>
-            <a:off x="504000" y="1769040"/>
-            <a:ext cx="4426560" cy="2090880"/>
-          </a:xfrm>
-          <a:prstGeom prst="rect">
-            <a:avLst/>
-          </a:prstGeom>
-        </p:spPr>
-        <p:txBody>
-          <a:bodyPr lIns="0" rIns="0" tIns="0" bIns="0"/>
-          <a:p>
-            <a:endParaRPr/>
-          </a:p>
-        </p:txBody>
-      </p:sp>
-      <p:sp>
-        <p:nvSpPr>
-          <p:cNvPr id="49" name="PlaceHolder 3"/>
-          <p:cNvSpPr>
-            <a:spLocks noGrp="1"/>
-          </p:cNvSpPr>
-          <p:nvPr>
-            <p:ph type="body"/>
-          </p:nvPr>
-        </p:nvSpPr>
-        <p:spPr>
-          <a:xfrm>
-            <a:off x="504000" y="4059000"/>
-            <a:ext cx="4426560" cy="2090880"/>
-          </a:xfrm>
-          <a:prstGeom prst="rect">
-            <a:avLst/>
-          </a:prstGeom>
-        </p:spPr>
-        <p:txBody>
-          <a:bodyPr lIns="0" rIns="0" tIns="0" bIns="0"/>
-          <a:p>
-            <a:endParaRPr/>
-          </a:p>
-        </p:txBody>
-      </p:sp>
-      <p:sp>
-        <p:nvSpPr>
-          <p:cNvPr id="50" name="PlaceHolder 4"/>
-          <p:cNvSpPr>
-            <a:spLocks noGrp="1"/>
-          </p:cNvSpPr>
-          <p:nvPr>
-            <p:ph type="body"/>
-          </p:nvPr>
-        </p:nvSpPr>
-        <p:spPr>
-          <a:xfrm>
-            <a:off x="5152320" y="1769040"/>
-            <a:ext cx="4426560" cy="4384080"/>
-          </a:xfrm>
-          <a:prstGeom prst="rect">
-            <a:avLst/>
-          </a:prstGeom>
-        </p:spPr>
-        <p:txBody>
-          <a:bodyPr lIns="0" rIns="0" tIns="0" bIns="0"/>
-          <a:p>
-            <a:endParaRPr/>
-          </a:p>
-        </p:txBody>
-      </p:sp>
     </p:spTree>
   </p:cSld>
 </p:sldLayout>
@@ -971,7 +471,7 @@
         <p:spPr>
           <a:xfrm>
             <a:off x="504000" y="301320"/>
-            <a:ext cx="9071280" cy="1262520"/>
+            <a:ext cx="9072000" cy="1262160"/>
           </a:xfrm>
           <a:prstGeom prst="rect">
             <a:avLst/>
@@ -997,8 +497,8 @@
         </p:nvSpPr>
         <p:spPr>
           <a:xfrm>
-            <a:off x="504000" y="1769040"/>
-            <a:ext cx="9071280" cy="4384440"/>
+            <a:off x="504000" y="1768680"/>
+            <a:ext cx="9072000" cy="4384440"/>
           </a:xfrm>
           <a:prstGeom prst="rect">
             <a:avLst/>
@@ -1012,665 +512,6 @@
           </a:p>
         </p:txBody>
       </p:sp>
-    </p:spTree>
-  </p:cSld>
-</p:sldLayout>
-</file>
-
-<file path=ppt/slideLayouts/slideLayout20.xml><?xml version="1.0" encoding="utf-8"?>
-<p:sldLayout xmlns:a="http://schemas.openxmlformats.org/drawingml/2006/main" xmlns:p="http://schemas.openxmlformats.org/presentationml/2006/main" xmlns:r="http://schemas.openxmlformats.org/officeDocument/2006/relationships" type="objAndTwoObj" preserve="1">
-  <p:cSld name="Title Content and 2 Content">
-    <p:spTree>
-      <p:nvGrpSpPr>
-        <p:cNvPr id="1" name=""/>
-        <p:cNvGrpSpPr/>
-        <p:nvPr/>
-      </p:nvGrpSpPr>
-      <p:grpSpPr>
-        <a:xfrm>
-          <a:off x="0" y="0"/>
-          <a:ext cx="0" cy="0"/>
-          <a:chOff x="0" y="0"/>
-          <a:chExt cx="0" cy="0"/>
-        </a:xfrm>
-      </p:grpSpPr>
-      <p:sp>
-        <p:nvSpPr>
-          <p:cNvPr id="51" name="PlaceHolder 1"/>
-          <p:cNvSpPr>
-            <a:spLocks noGrp="1"/>
-          </p:cNvSpPr>
-          <p:nvPr>
-            <p:ph type="title"/>
-          </p:nvPr>
-        </p:nvSpPr>
-        <p:spPr>
-          <a:xfrm>
-            <a:off x="504000" y="301320"/>
-            <a:ext cx="9071280" cy="1262520"/>
-          </a:xfrm>
-          <a:prstGeom prst="rect">
-            <a:avLst/>
-          </a:prstGeom>
-        </p:spPr>
-        <p:txBody>
-          <a:bodyPr lIns="0" rIns="0" tIns="0" bIns="0" anchor="ctr"/>
-          <a:p>
-            <a:pPr algn="ctr"/>
-            <a:endParaRPr/>
-          </a:p>
-        </p:txBody>
-      </p:sp>
-      <p:sp>
-        <p:nvSpPr>
-          <p:cNvPr id="52" name="PlaceHolder 2"/>
-          <p:cNvSpPr>
-            <a:spLocks noGrp="1"/>
-          </p:cNvSpPr>
-          <p:nvPr>
-            <p:ph type="body"/>
-          </p:nvPr>
-        </p:nvSpPr>
-        <p:spPr>
-          <a:xfrm>
-            <a:off x="504000" y="1769040"/>
-            <a:ext cx="4426560" cy="4384080"/>
-          </a:xfrm>
-          <a:prstGeom prst="rect">
-            <a:avLst/>
-          </a:prstGeom>
-        </p:spPr>
-        <p:txBody>
-          <a:bodyPr lIns="0" rIns="0" tIns="0" bIns="0"/>
-          <a:p>
-            <a:endParaRPr/>
-          </a:p>
-        </p:txBody>
-      </p:sp>
-      <p:sp>
-        <p:nvSpPr>
-          <p:cNvPr id="53" name="PlaceHolder 3"/>
-          <p:cNvSpPr>
-            <a:spLocks noGrp="1"/>
-          </p:cNvSpPr>
-          <p:nvPr>
-            <p:ph type="body"/>
-          </p:nvPr>
-        </p:nvSpPr>
-        <p:spPr>
-          <a:xfrm>
-            <a:off x="5152320" y="1769040"/>
-            <a:ext cx="4426560" cy="2090880"/>
-          </a:xfrm>
-          <a:prstGeom prst="rect">
-            <a:avLst/>
-          </a:prstGeom>
-        </p:spPr>
-        <p:txBody>
-          <a:bodyPr lIns="0" rIns="0" tIns="0" bIns="0"/>
-          <a:p>
-            <a:endParaRPr/>
-          </a:p>
-        </p:txBody>
-      </p:sp>
-      <p:sp>
-        <p:nvSpPr>
-          <p:cNvPr id="54" name="PlaceHolder 4"/>
-          <p:cNvSpPr>
-            <a:spLocks noGrp="1"/>
-          </p:cNvSpPr>
-          <p:nvPr>
-            <p:ph type="body"/>
-          </p:nvPr>
-        </p:nvSpPr>
-        <p:spPr>
-          <a:xfrm>
-            <a:off x="5152320" y="4059000"/>
-            <a:ext cx="4426560" cy="2090880"/>
-          </a:xfrm>
-          <a:prstGeom prst="rect">
-            <a:avLst/>
-          </a:prstGeom>
-        </p:spPr>
-        <p:txBody>
-          <a:bodyPr lIns="0" rIns="0" tIns="0" bIns="0"/>
-          <a:p>
-            <a:endParaRPr/>
-          </a:p>
-        </p:txBody>
-      </p:sp>
-    </p:spTree>
-  </p:cSld>
-</p:sldLayout>
-</file>
-
-<file path=ppt/slideLayouts/slideLayout21.xml><?xml version="1.0" encoding="utf-8"?>
-<p:sldLayout xmlns:a="http://schemas.openxmlformats.org/drawingml/2006/main" xmlns:p="http://schemas.openxmlformats.org/presentationml/2006/main" xmlns:r="http://schemas.openxmlformats.org/officeDocument/2006/relationships" type="twoObjOverTx" preserve="1">
-  <p:cSld name="Title, 2 Content over Content">
-    <p:spTree>
-      <p:nvGrpSpPr>
-        <p:cNvPr id="1" name=""/>
-        <p:cNvGrpSpPr/>
-        <p:nvPr/>
-      </p:nvGrpSpPr>
-      <p:grpSpPr>
-        <a:xfrm>
-          <a:off x="0" y="0"/>
-          <a:ext cx="0" cy="0"/>
-          <a:chOff x="0" y="0"/>
-          <a:chExt cx="0" cy="0"/>
-        </a:xfrm>
-      </p:grpSpPr>
-      <p:sp>
-        <p:nvSpPr>
-          <p:cNvPr id="55" name="PlaceHolder 1"/>
-          <p:cNvSpPr>
-            <a:spLocks noGrp="1"/>
-          </p:cNvSpPr>
-          <p:nvPr>
-            <p:ph type="title"/>
-          </p:nvPr>
-        </p:nvSpPr>
-        <p:spPr>
-          <a:xfrm>
-            <a:off x="504000" y="301320"/>
-            <a:ext cx="9071280" cy="1262520"/>
-          </a:xfrm>
-          <a:prstGeom prst="rect">
-            <a:avLst/>
-          </a:prstGeom>
-        </p:spPr>
-        <p:txBody>
-          <a:bodyPr lIns="0" rIns="0" tIns="0" bIns="0" anchor="ctr"/>
-          <a:p>
-            <a:pPr algn="ctr"/>
-            <a:endParaRPr/>
-          </a:p>
-        </p:txBody>
-      </p:sp>
-      <p:sp>
-        <p:nvSpPr>
-          <p:cNvPr id="56" name="PlaceHolder 2"/>
-          <p:cNvSpPr>
-            <a:spLocks noGrp="1"/>
-          </p:cNvSpPr>
-          <p:nvPr>
-            <p:ph type="body"/>
-          </p:nvPr>
-        </p:nvSpPr>
-        <p:spPr>
-          <a:xfrm>
-            <a:off x="504000" y="1769040"/>
-            <a:ext cx="4426560" cy="2090880"/>
-          </a:xfrm>
-          <a:prstGeom prst="rect">
-            <a:avLst/>
-          </a:prstGeom>
-        </p:spPr>
-        <p:txBody>
-          <a:bodyPr lIns="0" rIns="0" tIns="0" bIns="0"/>
-          <a:p>
-            <a:endParaRPr/>
-          </a:p>
-        </p:txBody>
-      </p:sp>
-      <p:sp>
-        <p:nvSpPr>
-          <p:cNvPr id="57" name="PlaceHolder 3"/>
-          <p:cNvSpPr>
-            <a:spLocks noGrp="1"/>
-          </p:cNvSpPr>
-          <p:nvPr>
-            <p:ph type="body"/>
-          </p:nvPr>
-        </p:nvSpPr>
-        <p:spPr>
-          <a:xfrm>
-            <a:off x="5152320" y="1769040"/>
-            <a:ext cx="4426560" cy="2090880"/>
-          </a:xfrm>
-          <a:prstGeom prst="rect">
-            <a:avLst/>
-          </a:prstGeom>
-        </p:spPr>
-        <p:txBody>
-          <a:bodyPr lIns="0" rIns="0" tIns="0" bIns="0"/>
-          <a:p>
-            <a:endParaRPr/>
-          </a:p>
-        </p:txBody>
-      </p:sp>
-      <p:sp>
-        <p:nvSpPr>
-          <p:cNvPr id="58" name="PlaceHolder 4"/>
-          <p:cNvSpPr>
-            <a:spLocks noGrp="1"/>
-          </p:cNvSpPr>
-          <p:nvPr>
-            <p:ph type="body"/>
-          </p:nvPr>
-        </p:nvSpPr>
-        <p:spPr>
-          <a:xfrm>
-            <a:off x="504000" y="4059000"/>
-            <a:ext cx="9071280" cy="2090880"/>
-          </a:xfrm>
-          <a:prstGeom prst="rect">
-            <a:avLst/>
-          </a:prstGeom>
-        </p:spPr>
-        <p:txBody>
-          <a:bodyPr lIns="0" rIns="0" tIns="0" bIns="0"/>
-          <a:p>
-            <a:endParaRPr/>
-          </a:p>
-        </p:txBody>
-      </p:sp>
-    </p:spTree>
-  </p:cSld>
-</p:sldLayout>
-</file>
-
-<file path=ppt/slideLayouts/slideLayout22.xml><?xml version="1.0" encoding="utf-8"?>
-<p:sldLayout xmlns:a="http://schemas.openxmlformats.org/drawingml/2006/main" xmlns:p="http://schemas.openxmlformats.org/presentationml/2006/main" xmlns:r="http://schemas.openxmlformats.org/officeDocument/2006/relationships" type="objOverTx" preserve="1">
-  <p:cSld name="Title, Content over Content">
-    <p:spTree>
-      <p:nvGrpSpPr>
-        <p:cNvPr id="1" name=""/>
-        <p:cNvGrpSpPr/>
-        <p:nvPr/>
-      </p:nvGrpSpPr>
-      <p:grpSpPr>
-        <a:xfrm>
-          <a:off x="0" y="0"/>
-          <a:ext cx="0" cy="0"/>
-          <a:chOff x="0" y="0"/>
-          <a:chExt cx="0" cy="0"/>
-        </a:xfrm>
-      </p:grpSpPr>
-      <p:sp>
-        <p:nvSpPr>
-          <p:cNvPr id="59" name="PlaceHolder 1"/>
-          <p:cNvSpPr>
-            <a:spLocks noGrp="1"/>
-          </p:cNvSpPr>
-          <p:nvPr>
-            <p:ph type="title"/>
-          </p:nvPr>
-        </p:nvSpPr>
-        <p:spPr>
-          <a:xfrm>
-            <a:off x="504000" y="301320"/>
-            <a:ext cx="9071280" cy="1262520"/>
-          </a:xfrm>
-          <a:prstGeom prst="rect">
-            <a:avLst/>
-          </a:prstGeom>
-        </p:spPr>
-        <p:txBody>
-          <a:bodyPr lIns="0" rIns="0" tIns="0" bIns="0" anchor="ctr"/>
-          <a:p>
-            <a:pPr algn="ctr"/>
-            <a:endParaRPr/>
-          </a:p>
-        </p:txBody>
-      </p:sp>
-      <p:sp>
-        <p:nvSpPr>
-          <p:cNvPr id="60" name="PlaceHolder 2"/>
-          <p:cNvSpPr>
-            <a:spLocks noGrp="1"/>
-          </p:cNvSpPr>
-          <p:nvPr>
-            <p:ph type="body"/>
-          </p:nvPr>
-        </p:nvSpPr>
-        <p:spPr>
-          <a:xfrm>
-            <a:off x="504000" y="1769040"/>
-            <a:ext cx="9071280" cy="2090880"/>
-          </a:xfrm>
-          <a:prstGeom prst="rect">
-            <a:avLst/>
-          </a:prstGeom>
-        </p:spPr>
-        <p:txBody>
-          <a:bodyPr lIns="0" rIns="0" tIns="0" bIns="0"/>
-          <a:p>
-            <a:endParaRPr/>
-          </a:p>
-        </p:txBody>
-      </p:sp>
-      <p:sp>
-        <p:nvSpPr>
-          <p:cNvPr id="61" name="PlaceHolder 3"/>
-          <p:cNvSpPr>
-            <a:spLocks noGrp="1"/>
-          </p:cNvSpPr>
-          <p:nvPr>
-            <p:ph type="body"/>
-          </p:nvPr>
-        </p:nvSpPr>
-        <p:spPr>
-          <a:xfrm>
-            <a:off x="504000" y="4059000"/>
-            <a:ext cx="9071280" cy="2090880"/>
-          </a:xfrm>
-          <a:prstGeom prst="rect">
-            <a:avLst/>
-          </a:prstGeom>
-        </p:spPr>
-        <p:txBody>
-          <a:bodyPr lIns="0" rIns="0" tIns="0" bIns="0"/>
-          <a:p>
-            <a:endParaRPr/>
-          </a:p>
-        </p:txBody>
-      </p:sp>
-    </p:spTree>
-  </p:cSld>
-</p:sldLayout>
-</file>
-
-<file path=ppt/slideLayouts/slideLayout23.xml><?xml version="1.0" encoding="utf-8"?>
-<p:sldLayout xmlns:a="http://schemas.openxmlformats.org/drawingml/2006/main" xmlns:p="http://schemas.openxmlformats.org/presentationml/2006/main" xmlns:r="http://schemas.openxmlformats.org/officeDocument/2006/relationships" type="fourObj" preserve="1">
-  <p:cSld name="Title, 4 Content">
-    <p:spTree>
-      <p:nvGrpSpPr>
-        <p:cNvPr id="1" name=""/>
-        <p:cNvGrpSpPr/>
-        <p:nvPr/>
-      </p:nvGrpSpPr>
-      <p:grpSpPr>
-        <a:xfrm>
-          <a:off x="0" y="0"/>
-          <a:ext cx="0" cy="0"/>
-          <a:chOff x="0" y="0"/>
-          <a:chExt cx="0" cy="0"/>
-        </a:xfrm>
-      </p:grpSpPr>
-      <p:sp>
-        <p:nvSpPr>
-          <p:cNvPr id="62" name="PlaceHolder 1"/>
-          <p:cNvSpPr>
-            <a:spLocks noGrp="1"/>
-          </p:cNvSpPr>
-          <p:nvPr>
-            <p:ph type="title"/>
-          </p:nvPr>
-        </p:nvSpPr>
-        <p:spPr>
-          <a:xfrm>
-            <a:off x="504000" y="301320"/>
-            <a:ext cx="9071280" cy="1262520"/>
-          </a:xfrm>
-          <a:prstGeom prst="rect">
-            <a:avLst/>
-          </a:prstGeom>
-        </p:spPr>
-        <p:txBody>
-          <a:bodyPr lIns="0" rIns="0" tIns="0" bIns="0" anchor="ctr"/>
-          <a:p>
-            <a:pPr algn="ctr"/>
-            <a:endParaRPr/>
-          </a:p>
-        </p:txBody>
-      </p:sp>
-      <p:sp>
-        <p:nvSpPr>
-          <p:cNvPr id="63" name="PlaceHolder 2"/>
-          <p:cNvSpPr>
-            <a:spLocks noGrp="1"/>
-          </p:cNvSpPr>
-          <p:nvPr>
-            <p:ph type="body"/>
-          </p:nvPr>
-        </p:nvSpPr>
-        <p:spPr>
-          <a:xfrm>
-            <a:off x="504000" y="1769040"/>
-            <a:ext cx="4426560" cy="2090880"/>
-          </a:xfrm>
-          <a:prstGeom prst="rect">
-            <a:avLst/>
-          </a:prstGeom>
-        </p:spPr>
-        <p:txBody>
-          <a:bodyPr lIns="0" rIns="0" tIns="0" bIns="0"/>
-          <a:p>
-            <a:endParaRPr/>
-          </a:p>
-        </p:txBody>
-      </p:sp>
-      <p:sp>
-        <p:nvSpPr>
-          <p:cNvPr id="64" name="PlaceHolder 3"/>
-          <p:cNvSpPr>
-            <a:spLocks noGrp="1"/>
-          </p:cNvSpPr>
-          <p:nvPr>
-            <p:ph type="body"/>
-          </p:nvPr>
-        </p:nvSpPr>
-        <p:spPr>
-          <a:xfrm>
-            <a:off x="5152320" y="1769040"/>
-            <a:ext cx="4426560" cy="2090880"/>
-          </a:xfrm>
-          <a:prstGeom prst="rect">
-            <a:avLst/>
-          </a:prstGeom>
-        </p:spPr>
-        <p:txBody>
-          <a:bodyPr lIns="0" rIns="0" tIns="0" bIns="0"/>
-          <a:p>
-            <a:endParaRPr/>
-          </a:p>
-        </p:txBody>
-      </p:sp>
-      <p:sp>
-        <p:nvSpPr>
-          <p:cNvPr id="65" name="PlaceHolder 4"/>
-          <p:cNvSpPr>
-            <a:spLocks noGrp="1"/>
-          </p:cNvSpPr>
-          <p:nvPr>
-            <p:ph type="body"/>
-          </p:nvPr>
-        </p:nvSpPr>
-        <p:spPr>
-          <a:xfrm>
-            <a:off x="5152320" y="4059000"/>
-            <a:ext cx="4426560" cy="2090880"/>
-          </a:xfrm>
-          <a:prstGeom prst="rect">
-            <a:avLst/>
-          </a:prstGeom>
-        </p:spPr>
-        <p:txBody>
-          <a:bodyPr lIns="0" rIns="0" tIns="0" bIns="0"/>
-          <a:p>
-            <a:endParaRPr/>
-          </a:p>
-        </p:txBody>
-      </p:sp>
-      <p:sp>
-        <p:nvSpPr>
-          <p:cNvPr id="66" name="PlaceHolder 5"/>
-          <p:cNvSpPr>
-            <a:spLocks noGrp="1"/>
-          </p:cNvSpPr>
-          <p:nvPr>
-            <p:ph type="body"/>
-          </p:nvPr>
-        </p:nvSpPr>
-        <p:spPr>
-          <a:xfrm>
-            <a:off x="504000" y="4059000"/>
-            <a:ext cx="4426560" cy="2090880"/>
-          </a:xfrm>
-          <a:prstGeom prst="rect">
-            <a:avLst/>
-          </a:prstGeom>
-        </p:spPr>
-        <p:txBody>
-          <a:bodyPr lIns="0" rIns="0" tIns="0" bIns="0"/>
-          <a:p>
-            <a:endParaRPr/>
-          </a:p>
-        </p:txBody>
-      </p:sp>
-    </p:spTree>
-  </p:cSld>
-</p:sldLayout>
-</file>
-
-<file path=ppt/slideLayouts/slideLayout24.xml><?xml version="1.0" encoding="utf-8"?>
-<p:sldLayout xmlns:a="http://schemas.openxmlformats.org/drawingml/2006/main" xmlns:p="http://schemas.openxmlformats.org/presentationml/2006/main" xmlns:r="http://schemas.openxmlformats.org/officeDocument/2006/relationships" type="blank" preserve="1">
-  <p:cSld name="Title, 6 Content">
-    <p:spTree>
-      <p:nvGrpSpPr>
-        <p:cNvPr id="1" name=""/>
-        <p:cNvGrpSpPr/>
-        <p:nvPr/>
-      </p:nvGrpSpPr>
-      <p:grpSpPr>
-        <a:xfrm>
-          <a:off x="0" y="0"/>
-          <a:ext cx="0" cy="0"/>
-          <a:chOff x="0" y="0"/>
-          <a:chExt cx="0" cy="0"/>
-        </a:xfrm>
-      </p:grpSpPr>
-      <p:sp>
-        <p:nvSpPr>
-          <p:cNvPr id="67" name="PlaceHolder 1"/>
-          <p:cNvSpPr>
-            <a:spLocks noGrp="1"/>
-          </p:cNvSpPr>
-          <p:nvPr>
-            <p:ph type="title"/>
-          </p:nvPr>
-        </p:nvSpPr>
-        <p:spPr>
-          <a:xfrm>
-            <a:off x="504000" y="301320"/>
-            <a:ext cx="9071280" cy="1262520"/>
-          </a:xfrm>
-          <a:prstGeom prst="rect">
-            <a:avLst/>
-          </a:prstGeom>
-        </p:spPr>
-        <p:txBody>
-          <a:bodyPr lIns="0" rIns="0" tIns="0" bIns="0" anchor="ctr"/>
-          <a:p>
-            <a:pPr algn="ctr"/>
-            <a:endParaRPr/>
-          </a:p>
-        </p:txBody>
-      </p:sp>
-      <p:sp>
-        <p:nvSpPr>
-          <p:cNvPr id="68" name="PlaceHolder 2"/>
-          <p:cNvSpPr>
-            <a:spLocks noGrp="1"/>
-          </p:cNvSpPr>
-          <p:nvPr>
-            <p:ph type="body"/>
-          </p:nvPr>
-        </p:nvSpPr>
-        <p:spPr>
-          <a:xfrm>
-            <a:off x="504000" y="1769040"/>
-            <a:ext cx="9071280" cy="4384080"/>
-          </a:xfrm>
-          <a:prstGeom prst="rect">
-            <a:avLst/>
-          </a:prstGeom>
-        </p:spPr>
-        <p:txBody>
-          <a:bodyPr lIns="0" rIns="0" tIns="0" bIns="0"/>
-          <a:p>
-            <a:endParaRPr/>
-          </a:p>
-        </p:txBody>
-      </p:sp>
-      <p:sp>
-        <p:nvSpPr>
-          <p:cNvPr id="69" name="PlaceHolder 3"/>
-          <p:cNvSpPr>
-            <a:spLocks noGrp="1"/>
-          </p:cNvSpPr>
-          <p:nvPr>
-            <p:ph type="body"/>
-          </p:nvPr>
-        </p:nvSpPr>
-        <p:spPr>
-          <a:xfrm>
-            <a:off x="504000" y="1769040"/>
-            <a:ext cx="9071280" cy="4384080"/>
-          </a:xfrm>
-          <a:prstGeom prst="rect">
-            <a:avLst/>
-          </a:prstGeom>
-        </p:spPr>
-        <p:txBody>
-          <a:bodyPr lIns="0" rIns="0" tIns="0" bIns="0"/>
-          <a:p>
-            <a:endParaRPr/>
-          </a:p>
-        </p:txBody>
-      </p:sp>
-      <p:pic>
-        <p:nvPicPr>
-          <p:cNvPr id="70" name="" descr=""/>
-          <p:cNvPicPr/>
-          <p:nvPr/>
-        </p:nvPicPr>
-        <p:blipFill>
-          <a:blip r:embed="rId2"/>
-          <a:stretch>
-            <a:fillRect/>
-          </a:stretch>
-        </p:blipFill>
-        <p:spPr>
-          <a:xfrm>
-            <a:off x="2292120" y="1769040"/>
-            <a:ext cx="5494680" cy="4384080"/>
-          </a:xfrm>
-          <a:prstGeom prst="rect">
-            <a:avLst/>
-          </a:prstGeom>
-          <a:ln>
-            <a:noFill/>
-          </a:ln>
-        </p:spPr>
-      </p:pic>
-      <p:pic>
-        <p:nvPicPr>
-          <p:cNvPr id="71" name="" descr=""/>
-          <p:cNvPicPr/>
-          <p:nvPr/>
-        </p:nvPicPr>
-        <p:blipFill>
-          <a:blip r:embed="rId3"/>
-          <a:stretch>
-            <a:fillRect/>
-          </a:stretch>
-        </p:blipFill>
-        <p:spPr>
-          <a:xfrm>
-            <a:off x="2292120" y="1769040"/>
-            <a:ext cx="5494680" cy="4384080"/>
-          </a:xfrm>
-          <a:prstGeom prst="rect">
-            <a:avLst/>
-          </a:prstGeom>
-          <a:ln>
-            <a:noFill/>
-          </a:ln>
-        </p:spPr>
-      </p:pic>
     </p:spTree>
   </p:cSld>
 </p:sldLayout>
@@ -1706,7 +547,7 @@
         <p:spPr>
           <a:xfrm>
             <a:off x="504000" y="301320"/>
-            <a:ext cx="9071280" cy="1262520"/>
+            <a:ext cx="9072000" cy="1262160"/>
           </a:xfrm>
           <a:prstGeom prst="rect">
             <a:avLst/>
@@ -1732,8 +573,8 @@
         </p:nvSpPr>
         <p:spPr>
           <a:xfrm>
-            <a:off x="504000" y="1769040"/>
-            <a:ext cx="9071280" cy="4384080"/>
+            <a:off x="504000" y="1768680"/>
+            <a:ext cx="9072000" cy="4384080"/>
           </a:xfrm>
           <a:prstGeom prst="rect">
             <a:avLst/>
@@ -1781,7 +622,7 @@
         <p:spPr>
           <a:xfrm>
             <a:off x="504000" y="301320"/>
-            <a:ext cx="9071280" cy="1262520"/>
+            <a:ext cx="9072000" cy="1262160"/>
           </a:xfrm>
           <a:prstGeom prst="rect">
             <a:avLst/>
@@ -1807,8 +648,8 @@
         </p:nvSpPr>
         <p:spPr>
           <a:xfrm>
-            <a:off x="504000" y="1769040"/>
-            <a:ext cx="4426560" cy="4384080"/>
+            <a:off x="504000" y="1768680"/>
+            <a:ext cx="4426920" cy="4384080"/>
           </a:xfrm>
           <a:prstGeom prst="rect">
             <a:avLst/>
@@ -1833,8 +674,8 @@
         </p:nvSpPr>
         <p:spPr>
           <a:xfrm>
-            <a:off x="5152320" y="1769040"/>
-            <a:ext cx="4426560" cy="4384080"/>
+            <a:off x="5152680" y="1768680"/>
+            <a:ext cx="4426920" cy="4384080"/>
           </a:xfrm>
           <a:prstGeom prst="rect">
             <a:avLst/>
@@ -1882,7 +723,7 @@
         <p:spPr>
           <a:xfrm>
             <a:off x="504000" y="301320"/>
-            <a:ext cx="9071280" cy="1262520"/>
+            <a:ext cx="9072000" cy="1262160"/>
           </a:xfrm>
           <a:prstGeom prst="rect">
             <a:avLst/>
@@ -1931,7 +772,7 @@
         <p:spPr>
           <a:xfrm>
             <a:off x="504000" y="301320"/>
-            <a:ext cx="9071280" cy="5852160"/>
+            <a:ext cx="9072000" cy="5850720"/>
           </a:xfrm>
           <a:prstGeom prst="rect">
             <a:avLst/>
@@ -1980,7 +821,7 @@
         <p:spPr>
           <a:xfrm>
             <a:off x="504000" y="301320"/>
-            <a:ext cx="9071280" cy="1262520"/>
+            <a:ext cx="9072000" cy="1262160"/>
           </a:xfrm>
           <a:prstGeom prst="rect">
             <a:avLst/>
@@ -2006,8 +847,8 @@
         </p:nvSpPr>
         <p:spPr>
           <a:xfrm>
-            <a:off x="504000" y="1769040"/>
-            <a:ext cx="4426560" cy="2090880"/>
+            <a:off x="504000" y="1768680"/>
+            <a:ext cx="4426920" cy="2090880"/>
           </a:xfrm>
           <a:prstGeom prst="rect">
             <a:avLst/>
@@ -2032,8 +873,8 @@
         </p:nvSpPr>
         <p:spPr>
           <a:xfrm>
-            <a:off x="504000" y="4059000"/>
-            <a:ext cx="4426560" cy="2090880"/>
+            <a:off x="504000" y="4058640"/>
+            <a:ext cx="4426920" cy="2090880"/>
           </a:xfrm>
           <a:prstGeom prst="rect">
             <a:avLst/>
@@ -2058,8 +899,8 @@
         </p:nvSpPr>
         <p:spPr>
           <a:xfrm>
-            <a:off x="5152320" y="1769040"/>
-            <a:ext cx="4426560" cy="4384080"/>
+            <a:off x="5152680" y="1768680"/>
+            <a:ext cx="4426920" cy="4384080"/>
           </a:xfrm>
           <a:prstGeom prst="rect">
             <a:avLst/>
@@ -2107,7 +948,7 @@
         <p:spPr>
           <a:xfrm>
             <a:off x="504000" y="301320"/>
-            <a:ext cx="9071280" cy="1262520"/>
+            <a:ext cx="9072000" cy="1262160"/>
           </a:xfrm>
           <a:prstGeom prst="rect">
             <a:avLst/>
@@ -2133,8 +974,8 @@
         </p:nvSpPr>
         <p:spPr>
           <a:xfrm>
-            <a:off x="504000" y="1769040"/>
-            <a:ext cx="4426560" cy="4384080"/>
+            <a:off x="504000" y="1768680"/>
+            <a:ext cx="4426920" cy="4384080"/>
           </a:xfrm>
           <a:prstGeom prst="rect">
             <a:avLst/>
@@ -2159,8 +1000,8 @@
         </p:nvSpPr>
         <p:spPr>
           <a:xfrm>
-            <a:off x="5152320" y="1769040"/>
-            <a:ext cx="4426560" cy="2090880"/>
+            <a:off x="5152680" y="1768680"/>
+            <a:ext cx="4426920" cy="2090880"/>
           </a:xfrm>
           <a:prstGeom prst="rect">
             <a:avLst/>
@@ -2185,8 +1026,8 @@
         </p:nvSpPr>
         <p:spPr>
           <a:xfrm>
-            <a:off x="5152320" y="4059000"/>
-            <a:ext cx="4426560" cy="2090880"/>
+            <a:off x="5152680" y="4058640"/>
+            <a:ext cx="4426920" cy="2090880"/>
           </a:xfrm>
           <a:prstGeom prst="rect">
             <a:avLst/>
@@ -2234,7 +1075,7 @@
         <p:spPr>
           <a:xfrm>
             <a:off x="504000" y="301320"/>
-            <a:ext cx="9071280" cy="1262520"/>
+            <a:ext cx="9072000" cy="1262160"/>
           </a:xfrm>
           <a:prstGeom prst="rect">
             <a:avLst/>
@@ -2260,8 +1101,8 @@
         </p:nvSpPr>
         <p:spPr>
           <a:xfrm>
-            <a:off x="504000" y="1769040"/>
-            <a:ext cx="4426560" cy="2090880"/>
+            <a:off x="504000" y="1768680"/>
+            <a:ext cx="4426920" cy="2090880"/>
           </a:xfrm>
           <a:prstGeom prst="rect">
             <a:avLst/>
@@ -2286,8 +1127,8 @@
         </p:nvSpPr>
         <p:spPr>
           <a:xfrm>
-            <a:off x="5152320" y="1769040"/>
-            <a:ext cx="4426560" cy="2090880"/>
+            <a:off x="5152680" y="1768680"/>
+            <a:ext cx="4426920" cy="2090880"/>
           </a:xfrm>
           <a:prstGeom prst="rect">
             <a:avLst/>
@@ -2312,8 +1153,8 @@
         </p:nvSpPr>
         <p:spPr>
           <a:xfrm>
-            <a:off x="504000" y="4059000"/>
-            <a:ext cx="9071280" cy="2090880"/>
+            <a:off x="504000" y="4058640"/>
+            <a:ext cx="9072000" cy="2090880"/>
           </a:xfrm>
           <a:prstGeom prst="rect">
             <a:avLst/>
@@ -2361,7 +1202,7 @@
         <p:spPr>
           <a:xfrm>
             <a:off x="504000" y="301320"/>
-            <a:ext cx="9071280" cy="1262160"/>
+            <a:ext cx="9072000" cy="1261800"/>
           </a:xfrm>
           <a:prstGeom prst="rect">
             <a:avLst/>
@@ -2518,197 +1359,6 @@
     <p:sldLayoutId id="2147483658" r:id="rId11"/>
     <p:sldLayoutId id="2147483659" r:id="rId12"/>
     <p:sldLayoutId id="2147483660" r:id="rId13"/>
-  </p:sldLayoutIdLst>
-</p:sldMaster>
-</file>
-
-<file path=ppt/slideMasters/slideMaster2.xml><?xml version="1.0" encoding="utf-8"?>
-<p:sldMaster xmlns:a="http://schemas.openxmlformats.org/drawingml/2006/main" xmlns:p="http://schemas.openxmlformats.org/presentationml/2006/main" xmlns:r="http://schemas.openxmlformats.org/officeDocument/2006/relationships">
-  <p:cSld>
-    <p:spTree>
-      <p:nvGrpSpPr>
-        <p:cNvPr id="1" name=""/>
-        <p:cNvGrpSpPr/>
-        <p:nvPr/>
-      </p:nvGrpSpPr>
-      <p:grpSpPr>
-        <a:xfrm>
-          <a:off x="0" y="0"/>
-          <a:ext cx="0" cy="0"/>
-          <a:chOff x="0" y="0"/>
-          <a:chExt cx="0" cy="0"/>
-        </a:xfrm>
-      </p:grpSpPr>
-      <p:sp>
-        <p:nvSpPr>
-          <p:cNvPr id="36" name="PlaceHolder 1"/>
-          <p:cNvSpPr>
-            <a:spLocks noGrp="1"/>
-          </p:cNvSpPr>
-          <p:nvPr>
-            <p:ph type="title"/>
-          </p:nvPr>
-        </p:nvSpPr>
-        <p:spPr>
-          <a:xfrm>
-            <a:off x="504000" y="301320"/>
-            <a:ext cx="9071280" cy="1262160"/>
-          </a:xfrm>
-          <a:prstGeom prst="rect">
-            <a:avLst/>
-          </a:prstGeom>
-        </p:spPr>
-        <p:txBody>
-          <a:bodyPr lIns="0" rIns="0" tIns="0" bIns="0" anchor="ctr"/>
-          <a:p>
-            <a:pPr algn="ctr"/>
-            <a:r>
-              <a:rPr lang="en-US" sz="4400">
-                <a:latin typeface="Arial"/>
-              </a:rPr>
-              <a:t>单击鼠标编辑标题文字格式</a:t>
-            </a:r>
-            <a:endParaRPr/>
-          </a:p>
-        </p:txBody>
-      </p:sp>
-      <p:sp>
-        <p:nvSpPr>
-          <p:cNvPr id="37" name="PlaceHolder 2"/>
-          <p:cNvSpPr>
-            <a:spLocks noGrp="1"/>
-          </p:cNvSpPr>
-          <p:nvPr>
-            <p:ph type="body"/>
-          </p:nvPr>
-        </p:nvSpPr>
-        <p:spPr>
-          <a:xfrm>
-            <a:off x="504000" y="1769040"/>
-            <a:ext cx="9071280" cy="4384080"/>
-          </a:xfrm>
-          <a:prstGeom prst="rect">
-            <a:avLst/>
-          </a:prstGeom>
-        </p:spPr>
-        <p:txBody>
-          <a:bodyPr lIns="0" rIns="0" tIns="0" bIns="0"/>
-          <a:p>
-            <a:pPr>
-              <a:buSzPct val="45000"/>
-              <a:buFont typeface="StarSymbol"/>
-              <a:buChar char=""/>
-            </a:pPr>
-            <a:r>
-              <a:rPr lang="en-US" sz="3200">
-                <a:latin typeface="Arial"/>
-              </a:rPr>
-              <a:t>单击鼠标编辑大纲文字格式</a:t>
-            </a:r>
-            <a:endParaRPr/>
-          </a:p>
-          <a:p>
-            <a:pPr lvl="1">
-              <a:buSzPct val="75000"/>
-              <a:buFont typeface="StarSymbol"/>
-              <a:buChar char=""/>
-            </a:pPr>
-            <a:r>
-              <a:rPr lang="en-US" sz="2800">
-                <a:latin typeface="Arial"/>
-              </a:rPr>
-              <a:t>第二个大纲级</a:t>
-            </a:r>
-            <a:endParaRPr/>
-          </a:p>
-          <a:p>
-            <a:pPr lvl="2">
-              <a:buSzPct val="45000"/>
-              <a:buFont typeface="StarSymbol"/>
-              <a:buChar char=""/>
-            </a:pPr>
-            <a:r>
-              <a:rPr lang="en-US" sz="2400">
-                <a:latin typeface="Arial"/>
-              </a:rPr>
-              <a:t>第三大纲级别</a:t>
-            </a:r>
-            <a:endParaRPr/>
-          </a:p>
-          <a:p>
-            <a:pPr lvl="3">
-              <a:buSzPct val="75000"/>
-              <a:buFont typeface="StarSymbol"/>
-              <a:buChar char=""/>
-            </a:pPr>
-            <a:r>
-              <a:rPr lang="en-US" sz="2000">
-                <a:latin typeface="Arial"/>
-              </a:rPr>
-              <a:t>第四大纲级别</a:t>
-            </a:r>
-            <a:endParaRPr/>
-          </a:p>
-          <a:p>
-            <a:pPr lvl="4">
-              <a:buSzPct val="45000"/>
-              <a:buFont typeface="StarSymbol"/>
-              <a:buChar char=""/>
-            </a:pPr>
-            <a:r>
-              <a:rPr lang="en-US" sz="2000">
-                <a:latin typeface="Arial"/>
-              </a:rPr>
-              <a:t>第五大纲级别</a:t>
-            </a:r>
-            <a:endParaRPr/>
-          </a:p>
-          <a:p>
-            <a:pPr lvl="5">
-              <a:buSzPct val="45000"/>
-              <a:buFont typeface="StarSymbol"/>
-              <a:buChar char=""/>
-            </a:pPr>
-            <a:r>
-              <a:rPr lang="en-US" sz="2000">
-                <a:latin typeface="Arial"/>
-              </a:rPr>
-              <a:t>第六大纲级别</a:t>
-            </a:r>
-            <a:endParaRPr/>
-          </a:p>
-          <a:p>
-            <a:pPr lvl="6">
-              <a:buSzPct val="45000"/>
-              <a:buFont typeface="StarSymbol"/>
-              <a:buChar char=""/>
-            </a:pPr>
-            <a:r>
-              <a:rPr lang="en-US" sz="2000">
-                <a:latin typeface="Arial"/>
-              </a:rPr>
-              <a:t>第七大纲级别</a:t>
-            </a:r>
-            <a:endParaRPr/>
-          </a:p>
-        </p:txBody>
-      </p:sp>
-    </p:spTree>
-  </p:cSld>
-  <p:clrMap bg1="lt1" bg2="lt2" tx1="dk1" tx2="dk2" accent1="accent1" accent2="accent2" accent3="accent3" accent4="accent4" accent5="accent5" accent6="accent6" hlink="hlink" folHlink="folHlink"/>
-  <p:sldLayoutIdLst>
-    <p:sldLayoutId id="2147483662" r:id="rId2"/>
-    <p:sldLayoutId id="2147483663" r:id="rId3"/>
-    <p:sldLayoutId id="2147483664" r:id="rId4"/>
-    <p:sldLayoutId id="2147483665" r:id="rId5"/>
-    <p:sldLayoutId id="2147483666" r:id="rId6"/>
-    <p:sldLayoutId id="2147483667" r:id="rId7"/>
-    <p:sldLayoutId id="2147483668" r:id="rId8"/>
-    <p:sldLayoutId id="2147483669" r:id="rId9"/>
-    <p:sldLayoutId id="2147483670" r:id="rId10"/>
-    <p:sldLayoutId id="2147483671" r:id="rId11"/>
-    <p:sldLayoutId id="2147483672" r:id="rId12"/>
-    <p:sldLayoutId id="2147483673" r:id="rId13"/>
   </p:sldLayoutIdLst>
 </p:sldMaster>
 </file>
@@ -2732,14 +1382,14 @@
       </p:grpSpPr>
       <p:sp>
         <p:nvSpPr>
-          <p:cNvPr id="72" name="CustomShape 1"/>
+          <p:cNvPr id="36" name="CustomShape 1"/>
           <p:cNvSpPr/>
           <p:nvPr/>
         </p:nvSpPr>
         <p:spPr>
           <a:xfrm>
             <a:off x="504000" y="301320"/>
-            <a:ext cx="9071280" cy="1261800"/>
+            <a:ext cx="9070920" cy="1261440"/>
           </a:xfrm>
           <a:prstGeom prst="rect">
             <a:avLst/>
@@ -2781,14 +1431,14 @@
       </p:sp>
       <p:sp>
         <p:nvSpPr>
-          <p:cNvPr id="73" name="CustomShape 2"/>
+          <p:cNvPr id="37" name="CustomShape 2"/>
           <p:cNvSpPr/>
           <p:nvPr/>
         </p:nvSpPr>
         <p:spPr>
           <a:xfrm>
             <a:off x="504000" y="1769040"/>
-            <a:ext cx="9071280" cy="4384080"/>
+            <a:ext cx="9070920" cy="4383720"/>
           </a:xfrm>
           <a:prstGeom prst="rect">
             <a:avLst/>
@@ -2913,7 +1563,7 @@
       </p:sp>
       <p:pic>
         <p:nvPicPr>
-          <p:cNvPr id="74" name="" descr=""/>
+          <p:cNvPr id="38" name="" descr=""/>
           <p:cNvPicPr/>
           <p:nvPr/>
         </p:nvPicPr>
@@ -2925,8 +1575,8 @@
         </p:blipFill>
         <p:spPr>
           <a:xfrm>
-            <a:off x="864000" y="2376000"/>
-            <a:ext cx="7055640" cy="1727640"/>
+            <a:off x="1152720" y="2160720"/>
+            <a:ext cx="7055280" cy="1727280"/>
           </a:xfrm>
           <a:prstGeom prst="rect">
             <a:avLst/>
@@ -2987,14 +1637,14 @@
       </p:grpSpPr>
       <p:sp>
         <p:nvSpPr>
-          <p:cNvPr id="75" name="CustomShape 1"/>
+          <p:cNvPr id="39" name="CustomShape 1"/>
           <p:cNvSpPr/>
           <p:nvPr/>
         </p:nvSpPr>
         <p:spPr>
           <a:xfrm>
             <a:off x="504000" y="301320"/>
-            <a:ext cx="9071280" cy="1261800"/>
+            <a:ext cx="9070920" cy="1261440"/>
           </a:xfrm>
           <a:prstGeom prst="rect">
             <a:avLst/>
@@ -3024,13 +1674,13 @@
       </p:sp>
       <p:graphicFrame>
         <p:nvGraphicFramePr>
-          <p:cNvPr id="76" name="Table 2"/>
+          <p:cNvPr id="40" name="Table 2"/>
           <p:cNvGraphicFramePr/>
           <p:nvPr/>
         </p:nvGraphicFramePr>
         <p:xfrm>
           <a:off x="504000" y="1769040"/>
-          <a:ext cx="9070560" cy="801720"/>
+          <a:ext cx="9070200" cy="801360"/>
         </p:xfrm>
         <a:graphic>
           <a:graphicData uri="http://schemas.openxmlformats.org/drawingml/2006/table">
@@ -3040,9 +1690,9 @@
                 <a:gridCol w="2267640"/>
                 <a:gridCol w="2267640"/>
                 <a:gridCol w="2267640"/>
-                <a:gridCol w="2268000"/>
+                <a:gridCol w="2267280"/>
               </a:tblGrid>
-              <a:tr h="401040">
+              <a:tr h="400680">
                 <a:tc>
                   <a:txBody>
                     <a:bodyPr/>
@@ -3062,7 +1712,11 @@
                   <a:txBody>
                     <a:bodyPr/>
                     <a:p>
-                      <a:pPr algn="ctr"/>
+                      <a:pPr algn="ctr">
+                        <a:lnSpc>
+                          <a:spcPct val="100000"/>
+                        </a:lnSpc>
+                      </a:pPr>
                       <a:r>
                         <a:rPr lang="en-US">
                           <a:latin typeface="Arial"/>
@@ -3078,7 +1732,11 @@
                   <a:txBody>
                     <a:bodyPr/>
                     <a:p>
-                      <a:pPr algn="ctr"/>
+                      <a:pPr algn="ctr">
+                        <a:lnSpc>
+                          <a:spcPct val="100000"/>
+                        </a:lnSpc>
+                      </a:pPr>
                       <a:r>
                         <a:rPr lang="en-US">
                           <a:latin typeface="Arial"/>
@@ -3094,7 +1752,11 @@
                   <a:txBody>
                     <a:bodyPr/>
                     <a:p>
-                      <a:pPr algn="ctr"/>
+                      <a:pPr algn="ctr">
+                        <a:lnSpc>
+                          <a:spcPct val="100000"/>
+                        </a:lnSpc>
+                      </a:pPr>
                       <a:r>
                         <a:rPr lang="en-US">
                           <a:latin typeface="Arial"/>
@@ -3107,12 +1769,16 @@
                   <a:tcPr/>
                 </a:tc>
               </a:tr>
-              <a:tr h="401040">
+              <a:tr h="400680">
                 <a:tc>
                   <a:txBody>
                     <a:bodyPr/>
                     <a:p>
-                      <a:pPr algn="ctr"/>
+                      <a:pPr algn="ctr">
+                        <a:lnSpc>
+                          <a:spcPct val="100000"/>
+                        </a:lnSpc>
+                      </a:pPr>
                       <a:r>
                         <a:rPr lang="en-US">
                           <a:latin typeface="Arial"/>
@@ -3128,7 +1794,11 @@
                   <a:txBody>
                     <a:bodyPr/>
                     <a:p>
-                      <a:pPr algn="ctr"/>
+                      <a:pPr algn="ctr">
+                        <a:lnSpc>
+                          <a:spcPct val="100000"/>
+                        </a:lnSpc>
+                      </a:pPr>
                       <a:r>
                         <a:rPr lang="en-US">
                           <a:latin typeface="Arial"/>
@@ -3144,7 +1814,11 @@
                   <a:txBody>
                     <a:bodyPr/>
                     <a:p>
-                      <a:pPr algn="ctr"/>
+                      <a:pPr algn="ctr">
+                        <a:lnSpc>
+                          <a:spcPct val="100000"/>
+                        </a:lnSpc>
+                      </a:pPr>
                       <a:r>
                         <a:rPr lang="en-US">
                           <a:latin typeface="Arial"/>
@@ -3160,7 +1834,11 @@
                   <a:txBody>
                     <a:bodyPr/>
                     <a:p>
-                      <a:pPr algn="ctr"/>
+                      <a:pPr algn="ctr">
+                        <a:lnSpc>
+                          <a:spcPct val="100000"/>
+                        </a:lnSpc>
+                      </a:pPr>
                       <a:r>
                         <a:rPr lang="en-US">
                           <a:latin typeface="Arial"/>
@@ -3179,13 +1857,13 @@
       </p:graphicFrame>
       <p:graphicFrame>
         <p:nvGraphicFramePr>
-          <p:cNvPr id="77" name="Table 3"/>
+          <p:cNvPr id="41" name="Table 3"/>
           <p:cNvGraphicFramePr/>
           <p:nvPr/>
         </p:nvGraphicFramePr>
         <p:xfrm>
           <a:off x="531720" y="3997440"/>
-          <a:ext cx="9070200" cy="801720"/>
+          <a:ext cx="9069840" cy="801360"/>
         </p:xfrm>
         <a:graphic>
           <a:graphicData uri="http://schemas.openxmlformats.org/drawingml/2006/table">
@@ -3195,7 +1873,7 @@
                 <a:gridCol w="2267640"/>
                 <a:gridCol w="2267640"/>
                 <a:gridCol w="2267640"/>
-                <a:gridCol w="2267640"/>
+                <a:gridCol w="2266920"/>
               </a:tblGrid>
               <a:tr h="388080">
                 <a:tc>
@@ -3217,7 +1895,11 @@
                   <a:txBody>
                     <a:bodyPr/>
                     <a:p>
-                      <a:pPr algn="ctr"/>
+                      <a:pPr algn="ctr">
+                        <a:lnSpc>
+                          <a:spcPct val="100000"/>
+                        </a:lnSpc>
+                      </a:pPr>
                       <a:r>
                         <a:rPr lang="en-US">
                           <a:latin typeface="Arial"/>
@@ -3233,7 +1915,11 @@
                   <a:txBody>
                     <a:bodyPr/>
                     <a:p>
-                      <a:pPr algn="ctr"/>
+                      <a:pPr algn="ctr">
+                        <a:lnSpc>
+                          <a:spcPct val="100000"/>
+                        </a:lnSpc>
+                      </a:pPr>
                       <a:r>
                         <a:rPr lang="en-US">
                           <a:latin typeface="Arial"/>
@@ -3249,7 +1935,11 @@
                   <a:txBody>
                     <a:bodyPr/>
                     <a:p>
-                      <a:pPr algn="ctr"/>
+                      <a:pPr algn="ctr">
+                        <a:lnSpc>
+                          <a:spcPct val="100000"/>
+                        </a:lnSpc>
+                      </a:pPr>
                       <a:r>
                         <a:rPr lang="en-US">
                           <a:latin typeface="Arial"/>
@@ -3262,12 +1952,16 @@
                   <a:tcPr/>
                 </a:tc>
               </a:tr>
-              <a:tr h="414000">
+              <a:tr h="413280">
                 <a:tc>
                   <a:txBody>
                     <a:bodyPr/>
                     <a:p>
-                      <a:pPr algn="ctr"/>
+                      <a:pPr algn="ctr">
+                        <a:lnSpc>
+                          <a:spcPct val="100000"/>
+                        </a:lnSpc>
+                      </a:pPr>
                       <a:r>
                         <a:rPr lang="en-US">
                           <a:latin typeface="Arial"/>
@@ -3283,7 +1977,11 @@
                   <a:txBody>
                     <a:bodyPr/>
                     <a:p>
-                      <a:pPr algn="ctr"/>
+                      <a:pPr algn="ctr">
+                        <a:lnSpc>
+                          <a:spcPct val="100000"/>
+                        </a:lnSpc>
+                      </a:pPr>
                       <a:r>
                         <a:rPr lang="en-US">
                           <a:latin typeface="Arial"/>
@@ -3299,7 +1997,11 @@
                   <a:txBody>
                     <a:bodyPr/>
                     <a:p>
-                      <a:pPr algn="ctr"/>
+                      <a:pPr algn="ctr">
+                        <a:lnSpc>
+                          <a:spcPct val="100000"/>
+                        </a:lnSpc>
+                      </a:pPr>
                       <a:r>
                         <a:rPr lang="en-US">
                           <a:latin typeface="Arial"/>
@@ -3315,7 +2017,11 @@
                   <a:txBody>
                     <a:bodyPr/>
                     <a:p>
-                      <a:pPr algn="ctr"/>
+                      <a:pPr algn="ctr">
+                        <a:lnSpc>
+                          <a:spcPct val="100000"/>
+                        </a:lnSpc>
+                      </a:pPr>
                       <a:r>
                         <a:rPr lang="en-US">
                           <a:latin typeface="Arial"/>
@@ -3334,18 +2040,22 @@
       </p:graphicFrame>
       <p:sp>
         <p:nvSpPr>
-          <p:cNvPr id="78" name="TextShape 4"/>
-          <p:cNvSpPr txBox="1"/>
+          <p:cNvPr id="42" name="CustomShape 4"/>
+          <p:cNvSpPr/>
           <p:nvPr/>
         </p:nvSpPr>
         <p:spPr>
           <a:xfrm>
             <a:off x="2304000" y="4968000"/>
-            <a:ext cx="6264000" cy="1591560"/>
-          </a:xfrm>
-          <a:prstGeom prst="rect">
-            <a:avLst/>
-          </a:prstGeom>
+            <a:ext cx="6263640" cy="1591200"/>
+          </a:xfrm>
+          <a:prstGeom prst="rect">
+            <a:avLst/>
+          </a:prstGeom>
+          <a:noFill/>
+          <a:ln>
+            <a:noFill/>
+          </a:ln>
         </p:spPr>
         <p:txBody>
           <a:bodyPr lIns="90000" rIns="90000" tIns="45000" bIns="45000"/>
@@ -3456,23 +2166,31 @@
       </p:grpSpPr>
       <p:sp>
         <p:nvSpPr>
-          <p:cNvPr id="79" name="TextShape 1"/>
-          <p:cNvSpPr txBox="1"/>
+          <p:cNvPr id="43" name="CustomShape 1"/>
+          <p:cNvSpPr/>
           <p:nvPr/>
         </p:nvSpPr>
         <p:spPr>
           <a:xfrm>
             <a:off x="504000" y="301320"/>
-            <a:ext cx="9071280" cy="1262160"/>
-          </a:xfrm>
-          <a:prstGeom prst="rect">
-            <a:avLst/>
-          </a:prstGeom>
+            <a:ext cx="9070920" cy="1261800"/>
+          </a:xfrm>
+          <a:prstGeom prst="rect">
+            <a:avLst/>
+          </a:prstGeom>
+          <a:noFill/>
+          <a:ln>
+            <a:noFill/>
+          </a:ln>
         </p:spPr>
         <p:txBody>
           <a:bodyPr lIns="0" rIns="0" tIns="0" bIns="0" anchor="ctr"/>
           <a:p>
-            <a:pPr algn="ctr"/>
+            <a:pPr algn="ctr">
+              <a:lnSpc>
+                <a:spcPct val="100000"/>
+              </a:lnSpc>
+            </a:pPr>
             <a:r>
               <a:rPr lang="en-US" sz="4400">
                 <a:latin typeface="Arial"/>
@@ -3485,18 +2203,22 @@
       </p:sp>
       <p:sp>
         <p:nvSpPr>
-          <p:cNvPr id="80" name="TextShape 2"/>
-          <p:cNvSpPr txBox="1"/>
+          <p:cNvPr id="44" name="CustomShape 2"/>
+          <p:cNvSpPr/>
           <p:nvPr/>
         </p:nvSpPr>
         <p:spPr>
           <a:xfrm>
             <a:off x="1152000" y="2592000"/>
-            <a:ext cx="6264000" cy="690840"/>
-          </a:xfrm>
-          <a:prstGeom prst="rect">
-            <a:avLst/>
-          </a:prstGeom>
+            <a:ext cx="6263640" cy="690480"/>
+          </a:xfrm>
+          <a:prstGeom prst="rect">
+            <a:avLst/>
+          </a:prstGeom>
+          <a:noFill/>
+          <a:ln>
+            <a:noFill/>
+          </a:ln>
         </p:spPr>
         <p:txBody>
           <a:bodyPr lIns="90000" rIns="90000" tIns="45000" bIns="45000"/>
@@ -3785,227 +2507,4 @@
     </a:fmtScheme>
   </a:themeElements>
 </a:theme>
-</file>
-
-<file path=ppt/theme/theme2.xml><?xml version="1.0" encoding="utf-8"?>
-<a:theme xmlns:a="http://schemas.openxmlformats.org/drawingml/2006/main" name="Office Theme">
-  <a:themeElements>
-    <a:clrScheme name="Office">
-      <a:dk1>
-        <a:sysClr val="windowText" lastClr="000000"/>
-      </a:dk1>
-      <a:lt1>
-        <a:sysClr val="window" lastClr="FFFFFF"/>
-      </a:lt1>
-      <a:dk2>
-        <a:srgbClr val="1F497D"/>
-      </a:dk2>
-      <a:lt2>
-        <a:srgbClr val="EEECE1"/>
-      </a:lt2>
-      <a:accent1>
-        <a:srgbClr val="4F81BD"/>
-      </a:accent1>
-      <a:accent2>
-        <a:srgbClr val="C0504D"/>
-      </a:accent2>
-      <a:accent3>
-        <a:srgbClr val="9BBB59"/>
-      </a:accent3>
-      <a:accent4>
-        <a:srgbClr val="8064A2"/>
-      </a:accent4>
-      <a:accent5>
-        <a:srgbClr val="4BACC6"/>
-      </a:accent5>
-      <a:accent6>
-        <a:srgbClr val="F79646"/>
-      </a:accent6>
-      <a:hlink>
-        <a:srgbClr val="0000FF"/>
-      </a:hlink>
-      <a:folHlink>
-        <a:srgbClr val="800080"/>
-      </a:folHlink>
-    </a:clrScheme>
-    <a:fontScheme name="Office">
-      <a:majorFont>
-        <a:latin typeface="Arial"/>
-        <a:ea typeface="DejaVu Sans"/>
-        <a:cs typeface="DejaVu Sans"/>
-      </a:majorFont>
-      <a:minorFont>
-        <a:latin typeface="Arial"/>
-        <a:ea typeface="DejaVu Sans"/>
-        <a:cs typeface="DejaVu Sans"/>
-      </a:minorFont>
-    </a:fontScheme>
-    <a:fmtScheme name="Office">
-      <a:fillStyleLst>
-        <a:solidFill>
-          <a:schemeClr val="phClr"/>
-        </a:solidFill>
-        <a:gradFill rotWithShape="1">
-          <a:gsLst>
-            <a:gs pos="0">
-              <a:schemeClr val="phClr">
-                <a:tint val="50000"/>
-                <a:satMod val="300000"/>
-              </a:schemeClr>
-            </a:gs>
-            <a:gs pos="35000">
-              <a:schemeClr val="phClr">
-                <a:tint val="37000"/>
-                <a:satMod val="300000"/>
-              </a:schemeClr>
-            </a:gs>
-            <a:gs pos="100000">
-              <a:schemeClr val="phClr">
-                <a:tint val="15000"/>
-                <a:satMod val="350000"/>
-              </a:schemeClr>
-            </a:gs>
-          </a:gsLst>
-          <a:lin ang="16200000" scaled="1"/>
-        </a:gradFill>
-        <a:gradFill rotWithShape="1">
-          <a:gsLst>
-            <a:gs pos="0">
-              <a:schemeClr val="phClr">
-                <a:shade val="51000"/>
-                <a:satMod val="130000"/>
-              </a:schemeClr>
-            </a:gs>
-            <a:gs pos="80000">
-              <a:schemeClr val="phClr">
-                <a:shade val="93000"/>
-                <a:satMod val="130000"/>
-              </a:schemeClr>
-            </a:gs>
-            <a:gs pos="100000">
-              <a:schemeClr val="phClr">
-                <a:shade val="94000"/>
-                <a:satMod val="135000"/>
-              </a:schemeClr>
-            </a:gs>
-          </a:gsLst>
-          <a:lin ang="16200000" scaled="0"/>
-        </a:gradFill>
-      </a:fillStyleLst>
-      <a:lnStyleLst>
-        <a:ln w="9525" cap="flat" cmpd="sng" algn="ctr">
-          <a:solidFill>
-            <a:schemeClr val="phClr">
-              <a:shade val="95000"/>
-              <a:satMod val="105000"/>
-            </a:schemeClr>
-          </a:solidFill>
-          <a:prstDash val="solid"/>
-        </a:ln>
-        <a:ln w="25400" cap="flat" cmpd="sng" algn="ctr">
-          <a:solidFill>
-            <a:schemeClr val="phClr"/>
-          </a:solidFill>
-          <a:prstDash val="solid"/>
-        </a:ln>
-        <a:ln w="38100" cap="flat" cmpd="sng" algn="ctr">
-          <a:solidFill>
-            <a:schemeClr val="phClr"/>
-          </a:solidFill>
-          <a:prstDash val="solid"/>
-        </a:ln>
-      </a:lnStyleLst>
-      <a:effectStyleLst>
-        <a:effectStyle>
-          <a:effectLst>
-            <a:outerShdw blurRad="40000" dist="20000" dir="5400000" rotWithShape="0">
-              <a:srgbClr val="000000">
-                <a:alpha val="38000"/>
-              </a:srgbClr>
-            </a:outerShdw>
-          </a:effectLst>
-        </a:effectStyle>
-        <a:effectStyle>
-          <a:effectLst>
-            <a:outerShdw blurRad="40000" dist="23000" dir="5400000" rotWithShape="0">
-              <a:srgbClr val="000000">
-                <a:alpha val="35000"/>
-              </a:srgbClr>
-            </a:outerShdw>
-          </a:effectLst>
-        </a:effectStyle>
-        <a:effectStyle>
-          <a:effectLst>
-            <a:outerShdw blurRad="40000" dist="23000" dir="5400000" rotWithShape="0">
-              <a:srgbClr val="000000">
-                <a:alpha val="35000"/>
-              </a:srgbClr>
-            </a:outerShdw>
-          </a:effectLst>
-          <a:scene3d>
-            <a:camera prst="orthographicFront">
-              <a:rot lat="0" lon="0" rev="0"/>
-            </a:camera>
-            <a:lightRig rig="threePt" dir="t">
-              <a:rot lat="0" lon="0" rev="1200000"/>
-            </a:lightRig>
-          </a:scene3d>
-          <a:sp3d>
-            <a:bevelT w="63500" h="25400"/>
-          </a:sp3d>
-        </a:effectStyle>
-      </a:effectStyleLst>
-      <a:bgFillStyleLst>
-        <a:solidFill>
-          <a:schemeClr val="phClr"/>
-        </a:solidFill>
-        <a:gradFill rotWithShape="1">
-          <a:gsLst>
-            <a:gs pos="0">
-              <a:schemeClr val="phClr">
-                <a:tint val="40000"/>
-                <a:satMod val="350000"/>
-              </a:schemeClr>
-            </a:gs>
-            <a:gs pos="40000">
-              <a:schemeClr val="phClr">
-                <a:tint val="45000"/>
-                <a:shade val="99000"/>
-                <a:satMod val="350000"/>
-              </a:schemeClr>
-            </a:gs>
-            <a:gs pos="100000">
-              <a:schemeClr val="phClr">
-                <a:shade val="20000"/>
-                <a:satMod val="255000"/>
-              </a:schemeClr>
-            </a:gs>
-          </a:gsLst>
-          <a:path path="circle">
-            <a:fillToRect l="50000" t="-80000" r="50000" b="180000"/>
-          </a:path>
-        </a:gradFill>
-        <a:gradFill rotWithShape="1">
-          <a:gsLst>
-            <a:gs pos="0">
-              <a:schemeClr val="phClr">
-                <a:tint val="80000"/>
-                <a:satMod val="300000"/>
-              </a:schemeClr>
-            </a:gs>
-            <a:gs pos="100000">
-              <a:schemeClr val="phClr">
-                <a:shade val="30000"/>
-                <a:satMod val="200000"/>
-              </a:schemeClr>
-            </a:gs>
-          </a:gsLst>
-          <a:path path="circle">
-            <a:fillToRect l="50000" t="50000" r="50000" b="50000"/>
-          </a:path>
-        </a:gradFill>
-      </a:bgFillStyleLst>
-    </a:fmtScheme>
-  </a:themeElements>
-</a:theme>
 </file>
</xml_diff>